<commit_message>
Migrate from MUI to normal html to reduce bandle size
</commit_message>
<xml_diff>
--- a/BULK PAYMENT.pptx
+++ b/BULK PAYMENT.pptx
@@ -9,6 +9,7 @@
     <p:sldId id="257" r:id="rId3"/>
     <p:sldId id="258" r:id="rId4"/>
     <p:sldId id="259" r:id="rId5"/>
+    <p:sldId id="260" r:id="rId6"/>
   </p:sldIdLst>
   <p:sldSz cx="12192000" cy="6858000"/>
   <p:notesSz cx="6858000" cy="9144000"/>
@@ -107,6 +108,11 @@
       </a:defRPr>
     </a:lvl9pPr>
   </p:defaultTextStyle>
+  <p:extLst>
+    <p:ext uri="{EFAFB233-063F-42B5-8137-9DF3F51BA10A}">
+      <p15:sldGuideLst xmlns:p15="http://schemas.microsoft.com/office/powerpoint/2012/main"/>
+    </p:ext>
+  </p:extLst>
 </p:presentation>
 </file>
 
@@ -280,7 +286,7 @@
           <a:p>
             <a:fld id="{D4D96704-AD54-4C0D-AFCA-1DBCC581CBEA}" type="datetimeFigureOut">
               <a:rPr lang="en-US" smtClean="0"/>
-              <a:t>01/02/2020</a:t>
+              <a:t>08/02/2020</a:t>
             </a:fld>
             <a:endParaRPr lang="en-US"/>
           </a:p>
@@ -547,7 +553,7 @@
           <a:p>
             <a:fld id="{D4D96704-AD54-4C0D-AFCA-1DBCC581CBEA}" type="datetimeFigureOut">
               <a:rPr lang="en-US" smtClean="0"/>
-              <a:t>01/02/2020</a:t>
+              <a:t>08/02/2020</a:t>
             </a:fld>
             <a:endParaRPr lang="en-US"/>
           </a:p>
@@ -778,7 +784,7 @@
           <a:p>
             <a:fld id="{D4D96704-AD54-4C0D-AFCA-1DBCC581CBEA}" type="datetimeFigureOut">
               <a:rPr lang="en-US" smtClean="0"/>
-              <a:t>01/02/2020</a:t>
+              <a:t>08/02/2020</a:t>
             </a:fld>
             <a:endParaRPr lang="en-US"/>
           </a:p>
@@ -1088,7 +1094,7 @@
           <a:p>
             <a:fld id="{D4D96704-AD54-4C0D-AFCA-1DBCC581CBEA}" type="datetimeFigureOut">
               <a:rPr lang="en-US" smtClean="0"/>
-              <a:t>01/02/2020</a:t>
+              <a:t>08/02/2020</a:t>
             </a:fld>
             <a:endParaRPr lang="en-US"/>
           </a:p>
@@ -1561,7 +1567,7 @@
           <a:p>
             <a:fld id="{D4D96704-AD54-4C0D-AFCA-1DBCC581CBEA}" type="datetimeFigureOut">
               <a:rPr lang="en-US" smtClean="0"/>
-              <a:t>01/02/2020</a:t>
+              <a:t>08/02/2020</a:t>
             </a:fld>
             <a:endParaRPr lang="en-US"/>
           </a:p>
@@ -2108,7 +2114,7 @@
           <a:p>
             <a:fld id="{D4D96704-AD54-4C0D-AFCA-1DBCC581CBEA}" type="datetimeFigureOut">
               <a:rPr lang="en-US" smtClean="0"/>
-              <a:t>01/02/2020</a:t>
+              <a:t>08/02/2020</a:t>
             </a:fld>
             <a:endParaRPr lang="en-US"/>
           </a:p>
@@ -2882,7 +2888,7 @@
           <a:p>
             <a:fld id="{D4D96704-AD54-4C0D-AFCA-1DBCC581CBEA}" type="datetimeFigureOut">
               <a:rPr lang="en-US" smtClean="0"/>
-              <a:t>01/02/2020</a:t>
+              <a:t>08/02/2020</a:t>
             </a:fld>
             <a:endParaRPr lang="en-US"/>
           </a:p>
@@ -3057,7 +3063,7 @@
           <a:p>
             <a:fld id="{D4D96704-AD54-4C0D-AFCA-1DBCC581CBEA}" type="datetimeFigureOut">
               <a:rPr lang="en-US" smtClean="0"/>
-              <a:t>01/02/2020</a:t>
+              <a:t>08/02/2020</a:t>
             </a:fld>
             <a:endParaRPr lang="en-US"/>
           </a:p>
@@ -3280,7 +3286,7 @@
           <a:p>
             <a:fld id="{D4D96704-AD54-4C0D-AFCA-1DBCC581CBEA}" type="datetimeFigureOut">
               <a:rPr lang="en-US" smtClean="0"/>
-              <a:t>01/02/2020</a:t>
+              <a:t>08/02/2020</a:t>
             </a:fld>
             <a:endParaRPr lang="en-US"/>
           </a:p>
@@ -3460,7 +3466,7 @@
           <a:p>
             <a:fld id="{D4D96704-AD54-4C0D-AFCA-1DBCC581CBEA}" type="datetimeFigureOut">
               <a:rPr lang="en-US" smtClean="0"/>
-              <a:t>01/02/2020</a:t>
+              <a:t>08/02/2020</a:t>
             </a:fld>
             <a:endParaRPr lang="en-US"/>
           </a:p>
@@ -3749,7 +3755,7 @@
           <a:p>
             <a:fld id="{D4D96704-AD54-4C0D-AFCA-1DBCC581CBEA}" type="datetimeFigureOut">
               <a:rPr lang="en-US" smtClean="0"/>
-              <a:t>01/02/2020</a:t>
+              <a:t>08/02/2020</a:t>
             </a:fld>
             <a:endParaRPr lang="en-US"/>
           </a:p>
@@ -3991,7 +3997,7 @@
           <a:p>
             <a:fld id="{D4D96704-AD54-4C0D-AFCA-1DBCC581CBEA}" type="datetimeFigureOut">
               <a:rPr lang="en-US" smtClean="0"/>
-              <a:t>01/02/2020</a:t>
+              <a:t>08/02/2020</a:t>
             </a:fld>
             <a:endParaRPr lang="en-US"/>
           </a:p>
@@ -4370,7 +4376,7 @@
           <a:p>
             <a:fld id="{D4D96704-AD54-4C0D-AFCA-1DBCC581CBEA}" type="datetimeFigureOut">
               <a:rPr lang="en-US" smtClean="0"/>
-              <a:t>01/02/2020</a:t>
+              <a:t>08/02/2020</a:t>
             </a:fld>
             <a:endParaRPr lang="en-US"/>
           </a:p>
@@ -4488,7 +4494,7 @@
           <a:p>
             <a:fld id="{D4D96704-AD54-4C0D-AFCA-1DBCC581CBEA}" type="datetimeFigureOut">
               <a:rPr lang="en-US" smtClean="0"/>
-              <a:t>01/02/2020</a:t>
+              <a:t>08/02/2020</a:t>
             </a:fld>
             <a:endParaRPr lang="en-US"/>
           </a:p>
@@ -4583,7 +4589,7 @@
           <a:p>
             <a:fld id="{D4D96704-AD54-4C0D-AFCA-1DBCC581CBEA}" type="datetimeFigureOut">
               <a:rPr lang="en-US" smtClean="0"/>
-              <a:t>01/02/2020</a:t>
+              <a:t>08/02/2020</a:t>
             </a:fld>
             <a:endParaRPr lang="en-US"/>
           </a:p>
@@ -4832,7 +4838,7 @@
           <a:p>
             <a:fld id="{D4D96704-AD54-4C0D-AFCA-1DBCC581CBEA}" type="datetimeFigureOut">
               <a:rPr lang="en-US" smtClean="0"/>
-              <a:t>01/02/2020</a:t>
+              <a:t>08/02/2020</a:t>
             </a:fld>
             <a:endParaRPr lang="en-US"/>
           </a:p>
@@ -5089,7 +5095,7 @@
           <a:p>
             <a:fld id="{D4D96704-AD54-4C0D-AFCA-1DBCC581CBEA}" type="datetimeFigureOut">
               <a:rPr lang="en-US" smtClean="0"/>
-              <a:t>01/02/2020</a:t>
+              <a:t>08/02/2020</a:t>
             </a:fld>
             <a:endParaRPr lang="en-US"/>
           </a:p>
@@ -5332,7 +5338,7 @@
           <a:p>
             <a:fld id="{D4D96704-AD54-4C0D-AFCA-1DBCC581CBEA}" type="datetimeFigureOut">
               <a:rPr lang="en-US" smtClean="0"/>
-              <a:t>01/02/2020</a:t>
+              <a:t>08/02/2020</a:t>
             </a:fld>
             <a:endParaRPr lang="en-US"/>
           </a:p>
@@ -6646,11 +6652,7 @@
                       </a:pPr>
                       <a:r>
                         <a:rPr lang="en-US" dirty="0" err="1" smtClean="0"/>
-                        <a:t>BackOffice</a:t>
-                      </a:r>
-                      <a:r>
-                        <a:rPr lang="en-US" dirty="0" err="1" smtClean="0"/>
-                        <a:t>.viewUsers</a:t>
+                        <a:t>BackOffice.viewUsers</a:t>
                       </a:r>
                       <a:endParaRPr lang="en-US" dirty="0" smtClean="0"/>
                     </a:p>
@@ -6691,11 +6693,7 @@
                       </a:pPr>
                       <a:r>
                         <a:rPr lang="en-US" dirty="0" err="1" smtClean="0"/>
-                        <a:t>BackOffice</a:t>
-                      </a:r>
-                      <a:r>
-                        <a:rPr lang="en-US" dirty="0" err="1" smtClean="0"/>
-                        <a:t>.manageClient</a:t>
+                        <a:t>BackOffice.manageClient</a:t>
                       </a:r>
                       <a:endParaRPr lang="en-US" dirty="0" smtClean="0"/>
                     </a:p>
@@ -6706,11 +6704,7 @@
                       </a:pPr>
                       <a:r>
                         <a:rPr lang="en-US" dirty="0" err="1" smtClean="0"/>
-                        <a:t>BackOffice</a:t>
-                      </a:r>
-                      <a:r>
-                        <a:rPr lang="en-US" dirty="0" err="1" smtClean="0"/>
-                        <a:t>.viewClients</a:t>
+                        <a:t>BackOffice.viewClients</a:t>
                       </a:r>
                       <a:endParaRPr lang="en-US" dirty="0"/>
                     </a:p>
@@ -6974,7 +6968,6 @@
                         <a:rPr lang="en-US" dirty="0" smtClean="0"/>
                         <a:t>Anonymous</a:t>
                       </a:r>
-                      <a:endParaRPr lang="en-US" dirty="0" smtClean="0"/>
                     </a:p>
                   </a:txBody>
                   <a:tcPr/>
@@ -7008,7 +7001,6 @@
                         <a:rPr lang="en-US" dirty="0" smtClean="0"/>
                         <a:t>Anonymous</a:t>
                       </a:r>
-                      <a:endParaRPr lang="en-US" dirty="0" smtClean="0"/>
                     </a:p>
                   </a:txBody>
                   <a:tcPr/>
@@ -7190,6 +7182,425 @@
     <p:extLst>
       <p:ext uri="{BB962C8B-B14F-4D97-AF65-F5344CB8AC3E}">
         <p14:creationId xmlns:p14="http://schemas.microsoft.com/office/powerpoint/2010/main" val="143157826"/>
+      </p:ext>
+    </p:extLst>
+  </p:cSld>
+  <p:clrMapOvr>
+    <a:masterClrMapping/>
+  </p:clrMapOvr>
+</p:sld>
+</file>
+
+<file path=ppt/slides/slide5.xml><?xml version="1.0" encoding="utf-8"?>
+<p:sld xmlns:a="http://schemas.openxmlformats.org/drawingml/2006/main" xmlns:r="http://schemas.openxmlformats.org/officeDocument/2006/relationships" xmlns:p="http://schemas.openxmlformats.org/presentationml/2006/main">
+  <p:cSld>
+    <p:spTree>
+      <p:nvGrpSpPr>
+        <p:cNvPr id="1" name=""/>
+        <p:cNvGrpSpPr/>
+        <p:nvPr/>
+      </p:nvGrpSpPr>
+      <p:grpSpPr>
+        <a:xfrm>
+          <a:off x="0" y="0"/>
+          <a:ext cx="0" cy="0"/>
+          <a:chOff x="0" y="0"/>
+          <a:chExt cx="0" cy="0"/>
+        </a:xfrm>
+      </p:grpSpPr>
+      <p:sp>
+        <p:nvSpPr>
+          <p:cNvPr id="5" name="Rectangle 4"/>
+          <p:cNvSpPr/>
+          <p:nvPr/>
+        </p:nvSpPr>
+        <p:spPr>
+          <a:xfrm>
+            <a:off x="0" y="1"/>
+            <a:ext cx="12192000" cy="609600"/>
+          </a:xfrm>
+          <a:prstGeom prst="rect">
+            <a:avLst/>
+          </a:prstGeom>
+          <a:solidFill>
+            <a:srgbClr val="FFC000"/>
+          </a:solidFill>
+        </p:spPr>
+        <p:style>
+          <a:lnRef idx="2">
+            <a:schemeClr val="accent1">
+              <a:shade val="50000"/>
+            </a:schemeClr>
+          </a:lnRef>
+          <a:fillRef idx="1">
+            <a:schemeClr val="accent1"/>
+          </a:fillRef>
+          <a:effectRef idx="0">
+            <a:schemeClr val="accent1"/>
+          </a:effectRef>
+          <a:fontRef idx="minor">
+            <a:schemeClr val="lt1"/>
+          </a:fontRef>
+        </p:style>
+        <p:txBody>
+          <a:bodyPr rtlCol="0" anchor="ctr"/>
+          <a:lstStyle/>
+          <a:p>
+            <a:pPr algn="ctr"/>
+            <a:endParaRPr lang="en-US" dirty="0"/>
+          </a:p>
+        </p:txBody>
+      </p:sp>
+      <p:sp>
+        <p:nvSpPr>
+          <p:cNvPr id="7" name="Rectangle 6"/>
+          <p:cNvSpPr/>
+          <p:nvPr/>
+        </p:nvSpPr>
+        <p:spPr>
+          <a:xfrm>
+            <a:off x="0" y="609602"/>
+            <a:ext cx="12192000" cy="5756030"/>
+          </a:xfrm>
+          <a:prstGeom prst="rect">
+            <a:avLst/>
+          </a:prstGeom>
+          <a:noFill/>
+        </p:spPr>
+        <p:style>
+          <a:lnRef idx="2">
+            <a:schemeClr val="accent1">
+              <a:shade val="50000"/>
+            </a:schemeClr>
+          </a:lnRef>
+          <a:fillRef idx="1">
+            <a:schemeClr val="accent1"/>
+          </a:fillRef>
+          <a:effectRef idx="0">
+            <a:schemeClr val="accent1"/>
+          </a:effectRef>
+          <a:fontRef idx="minor">
+            <a:schemeClr val="lt1"/>
+          </a:fontRef>
+        </p:style>
+        <p:txBody>
+          <a:bodyPr rtlCol="0" anchor="ctr"/>
+          <a:lstStyle/>
+          <a:p>
+            <a:pPr algn="ctr"/>
+            <a:endParaRPr lang="en-US"/>
+          </a:p>
+        </p:txBody>
+      </p:sp>
+      <p:sp>
+        <p:nvSpPr>
+          <p:cNvPr id="8" name="Rectangle 7"/>
+          <p:cNvSpPr/>
+          <p:nvPr/>
+        </p:nvSpPr>
+        <p:spPr>
+          <a:xfrm>
+            <a:off x="1348153" y="2"/>
+            <a:ext cx="9612923" cy="609599"/>
+          </a:xfrm>
+          <a:prstGeom prst="rect">
+            <a:avLst/>
+          </a:prstGeom>
+          <a:noFill/>
+        </p:spPr>
+        <p:style>
+          <a:lnRef idx="2">
+            <a:schemeClr val="accent1">
+              <a:shade val="50000"/>
+            </a:schemeClr>
+          </a:lnRef>
+          <a:fillRef idx="1">
+            <a:schemeClr val="accent1"/>
+          </a:fillRef>
+          <a:effectRef idx="0">
+            <a:schemeClr val="accent1"/>
+          </a:effectRef>
+          <a:fontRef idx="minor">
+            <a:schemeClr val="lt1"/>
+          </a:fontRef>
+        </p:style>
+        <p:txBody>
+          <a:bodyPr rtlCol="0" anchor="ctr"/>
+          <a:lstStyle/>
+          <a:p>
+            <a:pPr algn="ctr"/>
+            <a:endParaRPr lang="en-US"/>
+          </a:p>
+        </p:txBody>
+      </p:sp>
+      <p:sp>
+        <p:nvSpPr>
+          <p:cNvPr id="9" name="Rectangle 8"/>
+          <p:cNvSpPr/>
+          <p:nvPr/>
+        </p:nvSpPr>
+        <p:spPr>
+          <a:xfrm>
+            <a:off x="1348154" y="609601"/>
+            <a:ext cx="9612922" cy="5756031"/>
+          </a:xfrm>
+          <a:prstGeom prst="rect">
+            <a:avLst/>
+          </a:prstGeom>
+          <a:noFill/>
+        </p:spPr>
+        <p:style>
+          <a:lnRef idx="2">
+            <a:schemeClr val="accent1">
+              <a:shade val="50000"/>
+            </a:schemeClr>
+          </a:lnRef>
+          <a:fillRef idx="1">
+            <a:schemeClr val="accent1"/>
+          </a:fillRef>
+          <a:effectRef idx="0">
+            <a:schemeClr val="accent1"/>
+          </a:effectRef>
+          <a:fontRef idx="minor">
+            <a:schemeClr val="lt1"/>
+          </a:fontRef>
+        </p:style>
+        <p:txBody>
+          <a:bodyPr rtlCol="0" anchor="ctr"/>
+          <a:lstStyle/>
+          <a:p>
+            <a:pPr algn="ctr"/>
+            <a:endParaRPr lang="en-US"/>
+          </a:p>
+        </p:txBody>
+      </p:sp>
+      <p:sp>
+        <p:nvSpPr>
+          <p:cNvPr id="10" name="Rectangle 9"/>
+          <p:cNvSpPr/>
+          <p:nvPr/>
+        </p:nvSpPr>
+        <p:spPr>
+          <a:xfrm>
+            <a:off x="0" y="6365632"/>
+            <a:ext cx="12192000" cy="492368"/>
+          </a:xfrm>
+          <a:prstGeom prst="rect">
+            <a:avLst/>
+          </a:prstGeom>
+          <a:noFill/>
+        </p:spPr>
+        <p:style>
+          <a:lnRef idx="2">
+            <a:schemeClr val="accent1">
+              <a:shade val="50000"/>
+            </a:schemeClr>
+          </a:lnRef>
+          <a:fillRef idx="1">
+            <a:schemeClr val="accent1"/>
+          </a:fillRef>
+          <a:effectRef idx="0">
+            <a:schemeClr val="accent1"/>
+          </a:effectRef>
+          <a:fontRef idx="minor">
+            <a:schemeClr val="lt1"/>
+          </a:fontRef>
+        </p:style>
+        <p:txBody>
+          <a:bodyPr rtlCol="0" anchor="ctr"/>
+          <a:lstStyle/>
+          <a:p>
+            <a:pPr algn="ctr"/>
+            <a:endParaRPr lang="en-US"/>
+          </a:p>
+        </p:txBody>
+      </p:sp>
+      <p:sp>
+        <p:nvSpPr>
+          <p:cNvPr id="11" name="Rectangle 10"/>
+          <p:cNvSpPr/>
+          <p:nvPr/>
+        </p:nvSpPr>
+        <p:spPr>
+          <a:xfrm>
+            <a:off x="1348153" y="6365632"/>
+            <a:ext cx="9612923" cy="492368"/>
+          </a:xfrm>
+          <a:prstGeom prst="rect">
+            <a:avLst/>
+          </a:prstGeom>
+          <a:noFill/>
+        </p:spPr>
+        <p:style>
+          <a:lnRef idx="2">
+            <a:schemeClr val="accent1">
+              <a:shade val="50000"/>
+            </a:schemeClr>
+          </a:lnRef>
+          <a:fillRef idx="1">
+            <a:schemeClr val="accent1"/>
+          </a:fillRef>
+          <a:effectRef idx="0">
+            <a:schemeClr val="accent1"/>
+          </a:effectRef>
+          <a:fontRef idx="minor">
+            <a:schemeClr val="lt1"/>
+          </a:fontRef>
+        </p:style>
+        <p:txBody>
+          <a:bodyPr rtlCol="0" anchor="ctr"/>
+          <a:lstStyle/>
+          <a:p>
+            <a:pPr algn="ctr"/>
+            <a:endParaRPr lang="en-US"/>
+          </a:p>
+        </p:txBody>
+      </p:sp>
+      <p:sp>
+        <p:nvSpPr>
+          <p:cNvPr id="12" name="TextBox 11"/>
+          <p:cNvSpPr txBox="1"/>
+          <p:nvPr/>
+        </p:nvSpPr>
+        <p:spPr>
+          <a:xfrm>
+            <a:off x="1500552" y="117233"/>
+            <a:ext cx="1220206" cy="369332"/>
+          </a:xfrm>
+          <a:prstGeom prst="rect">
+            <a:avLst/>
+          </a:prstGeom>
+          <a:noFill/>
+        </p:spPr>
+        <p:txBody>
+          <a:bodyPr wrap="none" rtlCol="0">
+            <a:spAutoFit/>
+          </a:bodyPr>
+          <a:lstStyle/>
+          <a:p>
+            <a:r>
+              <a:rPr lang="en-US" b="1" dirty="0" smtClean="0">
+                <a:solidFill>
+                  <a:schemeClr val="tx2"/>
+                </a:solidFill>
+              </a:rPr>
+              <a:t>BULK PAY</a:t>
+            </a:r>
+            <a:endParaRPr lang="en-US" b="1" dirty="0">
+              <a:solidFill>
+                <a:schemeClr val="tx2"/>
+              </a:solidFill>
+            </a:endParaRPr>
+          </a:p>
+        </p:txBody>
+      </p:sp>
+      <p:sp>
+        <p:nvSpPr>
+          <p:cNvPr id="13" name="TextBox 12"/>
+          <p:cNvSpPr txBox="1"/>
+          <p:nvPr/>
+        </p:nvSpPr>
+        <p:spPr>
+          <a:xfrm>
+            <a:off x="9866702" y="137780"/>
+            <a:ext cx="779381" cy="369332"/>
+          </a:xfrm>
+          <a:prstGeom prst="rect">
+            <a:avLst/>
+          </a:prstGeom>
+          <a:noFill/>
+        </p:spPr>
+        <p:txBody>
+          <a:bodyPr wrap="none" rtlCol="0">
+            <a:spAutoFit/>
+          </a:bodyPr>
+          <a:lstStyle/>
+          <a:p>
+            <a:r>
+              <a:rPr lang="en-US" dirty="0" smtClean="0">
+                <a:solidFill>
+                  <a:schemeClr val="bg1"/>
+                </a:solidFill>
+              </a:rPr>
+              <a:t>Login</a:t>
+            </a:r>
+            <a:endParaRPr lang="en-US" dirty="0">
+              <a:solidFill>
+                <a:schemeClr val="bg1"/>
+              </a:solidFill>
+            </a:endParaRPr>
+          </a:p>
+        </p:txBody>
+      </p:sp>
+      <p:sp>
+        <p:nvSpPr>
+          <p:cNvPr id="14" name="TextBox 13"/>
+          <p:cNvSpPr txBox="1"/>
+          <p:nvPr/>
+        </p:nvSpPr>
+        <p:spPr>
+          <a:xfrm>
+            <a:off x="9007170" y="137780"/>
+            <a:ext cx="859531" cy="369332"/>
+          </a:xfrm>
+          <a:prstGeom prst="rect">
+            <a:avLst/>
+          </a:prstGeom>
+          <a:noFill/>
+        </p:spPr>
+        <p:txBody>
+          <a:bodyPr wrap="none" rtlCol="0">
+            <a:spAutoFit/>
+          </a:bodyPr>
+          <a:lstStyle>
+            <a:defPPr>
+              <a:defRPr lang="en-US"/>
+            </a:defPPr>
+            <a:lvl1pPr>
+              <a:defRPr>
+                <a:solidFill>
+                  <a:schemeClr val="bg1"/>
+                </a:solidFill>
+              </a:defRPr>
+            </a:lvl1pPr>
+          </a:lstStyle>
+          <a:p>
+            <a:r>
+              <a:rPr lang="en-US" dirty="0" smtClean="0"/>
+              <a:t>Home</a:t>
+            </a:r>
+            <a:endParaRPr lang="en-US" dirty="0"/>
+          </a:p>
+        </p:txBody>
+      </p:sp>
+      <p:pic>
+        <p:nvPicPr>
+          <p:cNvPr id="18" name="Picture 17"/>
+          <p:cNvPicPr>
+            <a:picLocks noChangeAspect="1"/>
+          </p:cNvPicPr>
+          <p:nvPr/>
+        </p:nvPicPr>
+        <p:blipFill>
+          <a:blip r:embed="rId2"/>
+          <a:stretch>
+            <a:fillRect/>
+          </a:stretch>
+        </p:blipFill>
+        <p:spPr>
+          <a:xfrm>
+            <a:off x="1500552" y="766762"/>
+            <a:ext cx="9284679" cy="5324475"/>
+          </a:xfrm>
+          <a:prstGeom prst="rect">
+            <a:avLst/>
+          </a:prstGeom>
+        </p:spPr>
+      </p:pic>
+    </p:spTree>
+    <p:extLst>
+      <p:ext uri="{BB962C8B-B14F-4D97-AF65-F5344CB8AC3E}">
+        <p14:creationId xmlns:p14="http://schemas.microsoft.com/office/powerpoint/2010/main" val="4254487792"/>
       </p:ext>
     </p:extLst>
   </p:cSld>

</xml_diff>